<commit_message>
Add project structure, remove temp files
</commit_message>
<xml_diff>
--- a/עזרים לא לגיט/מצגת פרויקט גמר.pptx
+++ b/עזרים לא לגיט/מצגת פרויקט גמר.pptx
@@ -25,6 +25,7 @@
     <p:sldId id="273" r:id="rId19"/>
     <p:sldId id="274" r:id="rId20"/>
     <p:sldId id="275" r:id="rId21"/>
+    <p:sldId id="276" r:id="rId22"/>
   </p:sldIdLst>
   <p:sldSz cx="11430000" cy="6445250"/>
   <p:notesSz cx="11430000" cy="6445250"/>
@@ -203,7 +204,7 @@
           <a:p>
             <a:fld id="{1D8BD707-D9CF-40AE-B4C6-C98DA3205C09}" type="datetimeFigureOut">
               <a:rPr lang="en-US"/>
-              <a:t>11/8/2025</a:t>
+              <a:t>11/17/2025</a:t>
             </a:fld>
             <a:endParaRPr lang="en-US"/>
           </a:p>
@@ -380,7 +381,7 @@
           <a:p>
             <a:fld id="{1D8BD707-D9CF-40AE-B4C6-C98DA3205C09}" type="datetimeFigureOut">
               <a:rPr lang="en-US"/>
-              <a:t>11/8/2025</a:t>
+              <a:t>11/17/2025</a:t>
             </a:fld>
             <a:endParaRPr lang="en-US"/>
           </a:p>
@@ -594,7 +595,7 @@
           <a:p>
             <a:fld id="{1D8BD707-D9CF-40AE-B4C6-C98DA3205C09}" type="datetimeFigureOut">
               <a:rPr lang="en-US"/>
-              <a:t>11/8/2025</a:t>
+              <a:t>11/17/2025</a:t>
             </a:fld>
             <a:endParaRPr lang="en-US"/>
           </a:p>
@@ -794,7 +795,7 @@
           <a:p>
             <a:fld id="{1D8BD707-D9CF-40AE-B4C6-C98DA3205C09}" type="datetimeFigureOut">
               <a:rPr lang="en-US"/>
-              <a:t>11/8/2025</a:t>
+              <a:t>11/17/2025</a:t>
             </a:fld>
             <a:endParaRPr lang="en-US"/>
           </a:p>
@@ -913,7 +914,7 @@
           <a:p>
             <a:fld id="{1D8BD707-D9CF-40AE-B4C6-C98DA3205C09}" type="datetimeFigureOut">
               <a:rPr lang="en-US"/>
-              <a:t>11/8/2025</a:t>
+              <a:t>11/17/2025</a:t>
             </a:fld>
             <a:endParaRPr lang="en-US"/>
           </a:p>
@@ -1138,7 +1139,7 @@
           <a:p>
             <a:fld id="{1D8BD707-D9CF-40AE-B4C6-C98DA3205C09}" type="datetimeFigureOut">
               <a:rPr lang="en-US"/>
-              <a:t>11/8/2025</a:t>
+              <a:t>11/17/2025</a:t>
             </a:fld>
             <a:endParaRPr lang="en-US"/>
           </a:p>
@@ -7837,7 +7838,7 @@
         <p:spPr>
           <a:xfrm>
             <a:off x="5562600" y="1622425"/>
-            <a:ext cx="5062855" cy="3916457"/>
+            <a:ext cx="5062855" cy="4131900"/>
           </a:xfrm>
           <a:prstGeom prst="rect">
             <a:avLst/>
@@ -7859,8 +7860,13 @@
             </a:pPr>
             <a:r>
               <a:rPr lang="he-IL" sz="1400" dirty="0"/>
-              <a:t>העוזר מספק טפסים מובנים למילוי על ידי המאמן:</a:t>
-            </a:r>
+              <a:t>העוזר מספק טפסים מובנים למילוי על ידי המאמן(בשלב זה בצורה ידנית, בעתיד יתעדכן וישתמש בנתונים </a:t>
+            </a:r>
+            <a:r>
+              <a:rPr lang="he-IL" sz="1400"/>
+              <a:t>בזמן אמת):</a:t>
+            </a:r>
+            <a:endParaRPr lang="he-IL" sz="1400" dirty="0"/>
           </a:p>
           <a:p>
             <a:pPr marL="12700" algn="r">
@@ -11522,6 +11528,485 @@
         </p:txBody>
       </p:sp>
     </p:spTree>
+  </p:cSld>
+  <p:clrMapOvr>
+    <a:masterClrMapping/>
+  </p:clrMapOvr>
+</p:sld>
+</file>
+
+<file path=ppt/slides/slide21.xml><?xml version="1.0" encoding="utf-8"?>
+<p:sld xmlns:a="http://schemas.openxmlformats.org/drawingml/2006/main" xmlns:r="http://schemas.openxmlformats.org/officeDocument/2006/relationships" xmlns:p="http://schemas.openxmlformats.org/presentationml/2006/main">
+  <p:cSld>
+    <p:bg>
+      <p:bgPr>
+        <a:solidFill>
+          <a:schemeClr val="bg1"/>
+        </a:solidFill>
+        <a:effectLst/>
+      </p:bgPr>
+    </p:bg>
+    <p:spTree>
+      <p:nvGrpSpPr>
+        <p:cNvPr id="1" name=""/>
+        <p:cNvGrpSpPr/>
+        <p:nvPr/>
+      </p:nvGrpSpPr>
+      <p:grpSpPr>
+        <a:xfrm>
+          <a:off x="0" y="0"/>
+          <a:ext cx="0" cy="0"/>
+          <a:chOff x="0" y="0"/>
+          <a:chExt cx="0" cy="0"/>
+        </a:xfrm>
+      </p:grpSpPr>
+      <p:sp useBgFill="1">
+        <p:nvSpPr>
+          <p:cNvPr id="10" name="Rectangle 9">
+            <a:extLst>
+              <a:ext uri="{FF2B5EF4-FFF2-40B4-BE49-F238E27FC236}">
+                <a16:creationId xmlns:a16="http://schemas.microsoft.com/office/drawing/2014/main" id="{19D32F93-50AC-4C46-A5DB-291C60DDB7BD}"/>
+              </a:ext>
+              <a:ext uri="{C183D7F6-B498-43B3-948B-1728B52AA6E4}">
+                <adec:decorative xmlns:adec="http://schemas.microsoft.com/office/drawing/2017/decorative" val="1"/>
+              </a:ext>
+            </a:extLst>
+          </p:cNvPr>
+          <p:cNvSpPr>
+            <a:spLocks noGrp="1" noRot="1" noChangeAspect="1" noMove="1" noResize="1" noEditPoints="1" noAdjustHandles="1" noChangeArrowheads="1" noChangeShapeType="1" noTextEdit="1"/>
+          </p:cNvSpPr>
+          <p:nvPr>
+            <p:extLst>
+              <p:ext uri="{386F3935-93C4-4BCD-93E2-E3B085C9AB24}">
+                <p16:designElem xmlns:p16="http://schemas.microsoft.com/office/powerpoint/2015/main" val="1"/>
+              </p:ext>
+            </p:extLst>
+          </p:nvPr>
+        </p:nvSpPr>
+        <p:spPr>
+          <a:xfrm>
+            <a:off x="0" y="0"/>
+            <a:ext cx="11430000" cy="6445250"/>
+          </a:xfrm>
+          <a:prstGeom prst="rect">
+            <a:avLst/>
+          </a:prstGeom>
+          <a:ln>
+            <a:noFill/>
+          </a:ln>
+        </p:spPr>
+        <p:style>
+          <a:lnRef idx="2">
+            <a:schemeClr val="accent1">
+              <a:shade val="50000"/>
+            </a:schemeClr>
+          </a:lnRef>
+          <a:fillRef idx="1">
+            <a:schemeClr val="accent1"/>
+          </a:fillRef>
+          <a:effectRef idx="0">
+            <a:schemeClr val="accent1"/>
+          </a:effectRef>
+          <a:fontRef idx="minor">
+            <a:schemeClr val="lt1"/>
+          </a:fontRef>
+        </p:style>
+        <p:txBody>
+          <a:bodyPr rtlCol="0" anchor="ctr"/>
+          <a:lstStyle/>
+          <a:p>
+            <a:pPr algn="ctr"/>
+            <a:endParaRPr lang="en-US"/>
+          </a:p>
+        </p:txBody>
+      </p:sp>
+      <p:sp>
+        <p:nvSpPr>
+          <p:cNvPr id="12" name="Freeform: Shape 11">
+            <a:extLst>
+              <a:ext uri="{FF2B5EF4-FFF2-40B4-BE49-F238E27FC236}">
+                <a16:creationId xmlns:a16="http://schemas.microsoft.com/office/drawing/2014/main" id="{86FD7672-78BE-4D6F-A711-2CDB79B52DFF}"/>
+              </a:ext>
+              <a:ext uri="{C183D7F6-B498-43B3-948B-1728B52AA6E4}">
+                <adec:decorative xmlns:adec="http://schemas.microsoft.com/office/drawing/2017/decorative" val="1"/>
+              </a:ext>
+            </a:extLst>
+          </p:cNvPr>
+          <p:cNvSpPr>
+            <a:spLocks noGrp="1" noRot="1" noChangeAspect="1" noMove="1" noResize="1" noEditPoints="1" noAdjustHandles="1" noChangeArrowheads="1" noChangeShapeType="1" noTextEdit="1"/>
+          </p:cNvSpPr>
+          <p:nvPr>
+            <p:extLst>
+              <p:ext uri="{386F3935-93C4-4BCD-93E2-E3B085C9AB24}">
+                <p16:designElem xmlns:p16="http://schemas.microsoft.com/office/powerpoint/2015/main" val="1"/>
+              </p:ext>
+            </p:extLst>
+          </p:nvPr>
+        </p:nvSpPr>
+        <p:spPr>
+          <a:xfrm>
+            <a:off x="7073120" y="304047"/>
+            <a:ext cx="4053655" cy="5838833"/>
+          </a:xfrm>
+          <a:custGeom>
+            <a:avLst/>
+            <a:gdLst>
+              <a:gd name="connsiteX0" fmla="*/ 0 w 4323899"/>
+              <a:gd name="connsiteY0" fmla="*/ 0 h 6212748"/>
+              <a:gd name="connsiteX1" fmla="*/ 742501 w 4323899"/>
+              <a:gd name="connsiteY1" fmla="*/ 0 h 6212748"/>
+              <a:gd name="connsiteX2" fmla="*/ 4323899 w 4323899"/>
+              <a:gd name="connsiteY2" fmla="*/ 0 h 6212748"/>
+              <a:gd name="connsiteX3" fmla="*/ 4323899 w 4323899"/>
+              <a:gd name="connsiteY3" fmla="*/ 2864954 h 6212748"/>
+              <a:gd name="connsiteX4" fmla="*/ 880454 w 4323899"/>
+              <a:gd name="connsiteY4" fmla="*/ 6212748 h 6212748"/>
+              <a:gd name="connsiteX5" fmla="*/ 0 w 4323899"/>
+              <a:gd name="connsiteY5" fmla="*/ 6212748 h 6212748"/>
+              <a:gd name="connsiteX6" fmla="*/ 0 w 4323899"/>
+              <a:gd name="connsiteY6" fmla="*/ 6210962 h 6212748"/>
+            </a:gdLst>
+            <a:ahLst/>
+            <a:cxnLst>
+              <a:cxn ang="0">
+                <a:pos x="connsiteX0" y="connsiteY0"/>
+              </a:cxn>
+              <a:cxn ang="0">
+                <a:pos x="connsiteX1" y="connsiteY1"/>
+              </a:cxn>
+              <a:cxn ang="0">
+                <a:pos x="connsiteX2" y="connsiteY2"/>
+              </a:cxn>
+              <a:cxn ang="0">
+                <a:pos x="connsiteX3" y="connsiteY3"/>
+              </a:cxn>
+              <a:cxn ang="0">
+                <a:pos x="connsiteX4" y="connsiteY4"/>
+              </a:cxn>
+              <a:cxn ang="0">
+                <a:pos x="connsiteX5" y="connsiteY5"/>
+              </a:cxn>
+              <a:cxn ang="0">
+                <a:pos x="connsiteX6" y="connsiteY6"/>
+              </a:cxn>
+            </a:cxnLst>
+            <a:rect l="l" t="t" r="r" b="b"/>
+            <a:pathLst>
+              <a:path w="4323899" h="6212748">
+                <a:moveTo>
+                  <a:pt x="0" y="0"/>
+                </a:moveTo>
+                <a:lnTo>
+                  <a:pt x="742501" y="0"/>
+                </a:lnTo>
+                <a:lnTo>
+                  <a:pt x="4323899" y="0"/>
+                </a:lnTo>
+                <a:lnTo>
+                  <a:pt x="4323899" y="2864954"/>
+                </a:lnTo>
+                <a:lnTo>
+                  <a:pt x="880454" y="6212748"/>
+                </a:lnTo>
+                <a:lnTo>
+                  <a:pt x="0" y="6212748"/>
+                </a:lnTo>
+                <a:lnTo>
+                  <a:pt x="0" y="6210962"/>
+                </a:lnTo>
+                <a:close/>
+              </a:path>
+            </a:pathLst>
+          </a:custGeom>
+          <a:solidFill>
+            <a:schemeClr val="tx1">
+              <a:lumMod val="50000"/>
+              <a:lumOff val="50000"/>
+              <a:alpha val="25000"/>
+            </a:schemeClr>
+          </a:solidFill>
+          <a:ln>
+            <a:noFill/>
+          </a:ln>
+        </p:spPr>
+        <p:style>
+          <a:lnRef idx="2">
+            <a:schemeClr val="accent1">
+              <a:shade val="50000"/>
+            </a:schemeClr>
+          </a:lnRef>
+          <a:fillRef idx="1">
+            <a:schemeClr val="accent1"/>
+          </a:fillRef>
+          <a:effectRef idx="0">
+            <a:schemeClr val="accent1"/>
+          </a:effectRef>
+          <a:fontRef idx="minor">
+            <a:schemeClr val="lt1"/>
+          </a:fontRef>
+        </p:style>
+        <p:txBody>
+          <a:bodyPr wrap="square" rtlCol="0" anchor="ctr">
+            <a:noAutofit/>
+          </a:bodyPr>
+          <a:lstStyle/>
+          <a:p>
+            <a:pPr algn="ctr"/>
+            <a:endParaRPr lang="en-US"/>
+          </a:p>
+        </p:txBody>
+      </p:sp>
+      <p:sp>
+        <p:nvSpPr>
+          <p:cNvPr id="17" name="Right Triangle 13">
+            <a:extLst>
+              <a:ext uri="{FF2B5EF4-FFF2-40B4-BE49-F238E27FC236}">
+                <a16:creationId xmlns:a16="http://schemas.microsoft.com/office/drawing/2014/main" id="{827DC2C4-B485-428A-BF4A-472D2967F47F}"/>
+              </a:ext>
+              <a:ext uri="{C183D7F6-B498-43B3-948B-1728B52AA6E4}">
+                <adec:decorative xmlns:adec="http://schemas.microsoft.com/office/drawing/2017/decorative" val="1"/>
+              </a:ext>
+            </a:extLst>
+          </p:cNvPr>
+          <p:cNvSpPr>
+            <a:spLocks noGrp="1" noRot="1" noChangeAspect="1" noMove="1" noResize="1" noEditPoints="1" noAdjustHandles="1" noChangeArrowheads="1" noChangeShapeType="1" noTextEdit="1"/>
+          </p:cNvSpPr>
+          <p:nvPr>
+            <p:extLst>
+              <p:ext uri="{386F3935-93C4-4BCD-93E2-E3B085C9AB24}">
+                <p16:designElem xmlns:p16="http://schemas.microsoft.com/office/powerpoint/2015/main" val="1"/>
+              </p:ext>
+            </p:extLst>
+          </p:nvPr>
+        </p:nvSpPr>
+        <p:spPr>
+          <a:xfrm flipH="1">
+            <a:off x="8040675" y="3135097"/>
+            <a:ext cx="3086100" cy="3007783"/>
+          </a:xfrm>
+          <a:prstGeom prst="rtTriangle">
+            <a:avLst/>
+          </a:prstGeom>
+          <a:solidFill>
+            <a:schemeClr val="accent4"/>
+          </a:solidFill>
+          <a:ln>
+            <a:noFill/>
+          </a:ln>
+        </p:spPr>
+        <p:style>
+          <a:lnRef idx="2">
+            <a:schemeClr val="accent1">
+              <a:shade val="50000"/>
+            </a:schemeClr>
+          </a:lnRef>
+          <a:fillRef idx="1">
+            <a:schemeClr val="accent1"/>
+          </a:fillRef>
+          <a:effectRef idx="0">
+            <a:schemeClr val="accent1"/>
+          </a:effectRef>
+          <a:fontRef idx="minor">
+            <a:schemeClr val="lt1"/>
+          </a:fontRef>
+        </p:style>
+        <p:txBody>
+          <a:bodyPr rtlCol="0" anchor="ctr"/>
+          <a:lstStyle/>
+          <a:p>
+            <a:pPr algn="ctr"/>
+            <a:endParaRPr lang="en-US" dirty="0"/>
+          </a:p>
+        </p:txBody>
+      </p:sp>
+      <p:sp>
+        <p:nvSpPr>
+          <p:cNvPr id="16" name="Rectangle 15">
+            <a:extLst>
+              <a:ext uri="{FF2B5EF4-FFF2-40B4-BE49-F238E27FC236}">
+                <a16:creationId xmlns:a16="http://schemas.microsoft.com/office/drawing/2014/main" id="{4A62647B-1222-407C-8740-5A497612B1F5}"/>
+              </a:ext>
+              <a:ext uri="{C183D7F6-B498-43B3-948B-1728B52AA6E4}">
+                <adec:decorative xmlns:adec="http://schemas.microsoft.com/office/drawing/2017/decorative" val="1"/>
+              </a:ext>
+            </a:extLst>
+          </p:cNvPr>
+          <p:cNvSpPr>
+            <a:spLocks noGrp="1" noRot="1" noChangeAspect="1" noMove="1" noResize="1" noEditPoints="1" noAdjustHandles="1" noChangeArrowheads="1" noChangeShapeType="1" noTextEdit="1"/>
+          </p:cNvSpPr>
+          <p:nvPr>
+            <p:extLst>
+              <p:ext uri="{386F3935-93C4-4BCD-93E2-E3B085C9AB24}">
+                <p16:designElem xmlns:p16="http://schemas.microsoft.com/office/powerpoint/2015/main" val="1"/>
+              </p:ext>
+            </p:extLst>
+          </p:nvPr>
+        </p:nvSpPr>
+        <p:spPr>
+          <a:xfrm>
+            <a:off x="601663" y="585763"/>
+            <a:ext cx="10223487" cy="5270370"/>
+          </a:xfrm>
+          <a:prstGeom prst="rect">
+            <a:avLst/>
+          </a:prstGeom>
+          <a:noFill/>
+          <a:ln w="19050">
+            <a:solidFill>
+              <a:schemeClr val="tx1">
+                <a:lumMod val="75000"/>
+                <a:lumOff val="25000"/>
+              </a:schemeClr>
+            </a:solidFill>
+          </a:ln>
+        </p:spPr>
+        <p:style>
+          <a:lnRef idx="2">
+            <a:schemeClr val="accent1">
+              <a:shade val="50000"/>
+            </a:schemeClr>
+          </a:lnRef>
+          <a:fillRef idx="1">
+            <a:schemeClr val="accent1"/>
+          </a:fillRef>
+          <a:effectRef idx="0">
+            <a:schemeClr val="accent1"/>
+          </a:effectRef>
+          <a:fontRef idx="minor">
+            <a:schemeClr val="lt1"/>
+          </a:fontRef>
+        </p:style>
+        <p:txBody>
+          <a:bodyPr rtlCol="0" anchor="ctr"/>
+          <a:lstStyle/>
+          <a:p>
+            <a:pPr algn="ctr"/>
+            <a:endParaRPr lang="en-US"/>
+          </a:p>
+        </p:txBody>
+      </p:sp>
+      <p:sp>
+        <p:nvSpPr>
+          <p:cNvPr id="2" name="כותרת 1">
+            <a:extLst>
+              <a:ext uri="{FF2B5EF4-FFF2-40B4-BE49-F238E27FC236}">
+                <a16:creationId xmlns:a16="http://schemas.microsoft.com/office/drawing/2014/main" id="{C045C8B3-B32A-BFEB-4F4C-4E8B8799BF7A}"/>
+              </a:ext>
+            </a:extLst>
+          </p:cNvPr>
+          <p:cNvSpPr>
+            <a:spLocks noGrp="1"/>
+          </p:cNvSpPr>
+          <p:nvPr>
+            <p:ph type="title"/>
+          </p:nvPr>
+        </p:nvSpPr>
+        <p:spPr>
+          <a:xfrm>
+            <a:off x="7527462" y="757832"/>
+            <a:ext cx="3144971" cy="2676041"/>
+          </a:xfrm>
+        </p:spPr>
+        <p:txBody>
+          <a:bodyPr vert="horz" lIns="91440" tIns="45720" rIns="91440" bIns="45720" rtlCol="0" anchor="b">
+            <a:normAutofit/>
+          </a:bodyPr>
+          <a:lstStyle/>
+          <a:p>
+            <a:pPr algn="l" rtl="0">
+              <a:lnSpc>
+                <a:spcPct val="90000"/>
+              </a:lnSpc>
+              <a:spcBef>
+                <a:spcPct val="0"/>
+              </a:spcBef>
+            </a:pPr>
+            <a:r>
+              <a:rPr lang="en-US" sz="6000" kern="1200" dirty="0" err="1">
+                <a:solidFill>
+                  <a:schemeClr val="tx1"/>
+                </a:solidFill>
+                <a:latin typeface="+mj-lt"/>
+                <a:ea typeface="+mj-ea"/>
+                <a:cs typeface="+mj-cs"/>
+              </a:rPr>
+              <a:t>לוח</a:t>
+            </a:r>
+            <a:r>
+              <a:rPr lang="en-US" sz="6000" kern="1200" dirty="0">
+                <a:solidFill>
+                  <a:schemeClr val="tx1"/>
+                </a:solidFill>
+                <a:latin typeface="+mj-lt"/>
+                <a:ea typeface="+mj-ea"/>
+                <a:cs typeface="+mj-cs"/>
+              </a:rPr>
+              <a:t> </a:t>
+            </a:r>
+            <a:r>
+              <a:rPr lang="en-US" sz="6000" kern="1200" dirty="0" err="1">
+                <a:solidFill>
+                  <a:schemeClr val="tx1"/>
+                </a:solidFill>
+                <a:latin typeface="+mj-lt"/>
+                <a:ea typeface="+mj-ea"/>
+                <a:cs typeface="+mj-cs"/>
+              </a:rPr>
+              <a:t>זמנים</a:t>
+            </a:r>
+            <a:endParaRPr lang="en-US" sz="6000" kern="1200" dirty="0">
+              <a:solidFill>
+                <a:schemeClr val="tx1"/>
+              </a:solidFill>
+              <a:latin typeface="+mj-lt"/>
+              <a:ea typeface="+mj-ea"/>
+              <a:cs typeface="+mj-cs"/>
+            </a:endParaRPr>
+          </a:p>
+        </p:txBody>
+      </p:sp>
+      <p:pic>
+        <p:nvPicPr>
+          <p:cNvPr id="5" name="תמונה 4" descr="תמונה שמכילה טקסט, צילום מסך, תרשים, גופן&#10;&#10;תוכן בינה מלאכותית גנרטיבית עשוי להיות שגוי.">
+            <a:extLst>
+              <a:ext uri="{FF2B5EF4-FFF2-40B4-BE49-F238E27FC236}">
+                <a16:creationId xmlns:a16="http://schemas.microsoft.com/office/drawing/2014/main" id="{6DFB2497-16A4-38CF-9354-D5409479F539}"/>
+              </a:ext>
+            </a:extLst>
+          </p:cNvPr>
+          <p:cNvPicPr>
+            <a:picLocks noChangeAspect="1"/>
+          </p:cNvPicPr>
+          <p:nvPr/>
+        </p:nvPicPr>
+        <p:blipFill>
+          <a:blip r:embed="rId2" cstate="print">
+            <a:extLst>
+              <a:ext uri="{28A0092B-C50C-407E-A947-70E740481C1C}">
+                <a14:useLocalDpi xmlns:a14="http://schemas.microsoft.com/office/drawing/2010/main" val="0"/>
+              </a:ext>
+            </a:extLst>
+          </a:blip>
+          <a:stretch>
+            <a:fillRect/>
+          </a:stretch>
+        </p:blipFill>
+        <p:spPr>
+          <a:xfrm>
+            <a:off x="1215523" y="1611815"/>
+            <a:ext cx="5254346" cy="3205154"/>
+          </a:xfrm>
+          <a:prstGeom prst="rect">
+            <a:avLst/>
+          </a:prstGeom>
+        </p:spPr>
+      </p:pic>
+    </p:spTree>
+    <p:extLst>
+      <p:ext uri="{BB962C8B-B14F-4D97-AF65-F5344CB8AC3E}">
+        <p14:creationId xmlns:p14="http://schemas.microsoft.com/office/powerpoint/2010/main" val="1779155807"/>
+      </p:ext>
+    </p:extLst>
   </p:cSld>
   <p:clrMapOvr>
     <a:masterClrMapping/>

</xml_diff>